<commit_message>
Updating to include experiment results across models
</commit_message>
<xml_diff>
--- a/Final-Group-Presentation/Final-Group-Presentation.pptx
+++ b/Final-Group-Presentation/Final-Group-Presentation.pptx
@@ -5,7 +5,7 @@
     <p:sldMasterId id="2147483707" r:id="rId1"/>
   </p:sldMasterIdLst>
   <p:notesMasterIdLst>
-    <p:notesMasterId r:id="rId8"/>
+    <p:notesMasterId r:id="rId9"/>
   </p:notesMasterIdLst>
   <p:sldIdLst>
     <p:sldId id="256" r:id="rId2"/>
@@ -14,6 +14,7 @@
     <p:sldId id="261" r:id="rId5"/>
     <p:sldId id="260" r:id="rId6"/>
     <p:sldId id="262" r:id="rId7"/>
+    <p:sldId id="263" r:id="rId8"/>
   </p:sldIdLst>
   <p:sldSz cx="12192000" cy="6858000"/>
   <p:notesSz cx="6858000" cy="9144000"/>
@@ -588,7 +589,312 @@
 </c:chartSpace>
 </file>
 
+<file path=ppt/charts/chart2.xml><?xml version="1.0" encoding="utf-8"?>
+<c:chartSpace xmlns:c="http://schemas.openxmlformats.org/drawingml/2006/chart" xmlns:a="http://schemas.openxmlformats.org/drawingml/2006/main" xmlns:r="http://schemas.openxmlformats.org/officeDocument/2006/relationships" xmlns:c16r2="http://schemas.microsoft.com/office/drawing/2015/06/chart">
+  <c:date1904 val="0"/>
+  <c:lang val="en-US"/>
+  <c:roundedCorners val="0"/>
+  <mc:AlternateContent xmlns:mc="http://schemas.openxmlformats.org/markup-compatibility/2006">
+    <mc:Choice xmlns:c14="http://schemas.microsoft.com/office/drawing/2007/8/2/chart" Requires="c14">
+      <c14:style val="102"/>
+    </mc:Choice>
+    <mc:Fallback>
+      <c:style val="2"/>
+    </mc:Fallback>
+  </mc:AlternateContent>
+  <c:chart>
+    <c:autoTitleDeleted val="1"/>
+    <c:plotArea>
+      <c:layout/>
+      <c:barChart>
+        <c:barDir val="bar"/>
+        <c:grouping val="clustered"/>
+        <c:varyColors val="0"/>
+        <c:ser>
+          <c:idx val="0"/>
+          <c:order val="0"/>
+          <c:tx>
+            <c:strRef>
+              <c:f>Sheet1!$B$1</c:f>
+              <c:strCache>
+                <c:ptCount val="1"/>
+                <c:pt idx="0">
+                  <c:v>Recall (Macro)</c:v>
+                </c:pt>
+              </c:strCache>
+            </c:strRef>
+          </c:tx>
+          <c:spPr>
+            <a:solidFill>
+              <a:schemeClr val="accent1"/>
+            </a:solidFill>
+            <a:ln>
+              <a:noFill/>
+            </a:ln>
+            <a:effectLst/>
+          </c:spPr>
+          <c:invertIfNegative val="0"/>
+          <c:dLbls>
+            <c:numFmt formatCode="0.00%" sourceLinked="0"/>
+            <c:spPr>
+              <a:noFill/>
+              <a:ln>
+                <a:noFill/>
+              </a:ln>
+              <a:effectLst/>
+            </c:spPr>
+            <c:txPr>
+              <a:bodyPr rot="0" spcFirstLastPara="1" vertOverflow="ellipsis" vert="horz" wrap="square" lIns="38100" tIns="19050" rIns="38100" bIns="19050" anchor="ctr" anchorCtr="1">
+                <a:spAutoFit/>
+              </a:bodyPr>
+              <a:lstStyle/>
+              <a:p>
+                <a:pPr>
+                  <a:defRPr sz="1197" b="1" i="0" u="none" strike="noStrike" kern="1200" baseline="0">
+                    <a:solidFill>
+                      <a:schemeClr val="bg1">
+                        <a:lumMod val="50000"/>
+                      </a:schemeClr>
+                    </a:solidFill>
+                    <a:latin typeface="+mn-lt"/>
+                    <a:ea typeface="+mn-ea"/>
+                    <a:cs typeface="+mn-cs"/>
+                  </a:defRPr>
+                </a:pPr>
+                <a:endParaRPr lang="en-US"/>
+              </a:p>
+            </c:txPr>
+            <c:dLblPos val="outEnd"/>
+            <c:showLegendKey val="0"/>
+            <c:showVal val="1"/>
+            <c:showCatName val="0"/>
+            <c:showSerName val="0"/>
+            <c:showPercent val="0"/>
+            <c:showBubbleSize val="0"/>
+            <c:showLeaderLines val="0"/>
+            <c:extLst>
+              <c:ext xmlns:c15="http://schemas.microsoft.com/office/drawing/2012/chart" uri="{CE6537A1-D6FC-4f65-9D91-7224C49458BB}">
+                <c15:showLeaderLines val="1"/>
+                <c15:leaderLines>
+                  <c:spPr>
+                    <a:ln w="9525" cap="flat" cmpd="sng" algn="ctr">
+                      <a:solidFill>
+                        <a:schemeClr val="tx1">
+                          <a:lumMod val="35000"/>
+                          <a:lumOff val="65000"/>
+                        </a:schemeClr>
+                      </a:solidFill>
+                      <a:round/>
+                    </a:ln>
+                    <a:effectLst/>
+                  </c:spPr>
+                </c15:leaderLines>
+              </c:ext>
+            </c:extLst>
+          </c:dLbls>
+          <c:cat>
+            <c:strRef>
+              <c:f>Sheet1!$A$2:$A$4</c:f>
+              <c:strCache>
+                <c:ptCount val="3"/>
+                <c:pt idx="0">
+                  <c:v>MultinomialNB</c:v>
+                </c:pt>
+                <c:pt idx="1">
+                  <c:v>LogisticRegression</c:v>
+                </c:pt>
+                <c:pt idx="2">
+                  <c:v>LinearSVC</c:v>
+                </c:pt>
+              </c:strCache>
+            </c:strRef>
+          </c:cat>
+          <c:val>
+            <c:numRef>
+              <c:f>Sheet1!$B$2:$B$4</c:f>
+              <c:numCache>
+                <c:formatCode>General</c:formatCode>
+                <c:ptCount val="3"/>
+                <c:pt idx="0">
+                  <c:v>0.40858800000000001</c:v>
+                </c:pt>
+                <c:pt idx="1">
+                  <c:v>0.79420800000000003</c:v>
+                </c:pt>
+                <c:pt idx="2">
+                  <c:v>0.899447</c:v>
+                </c:pt>
+              </c:numCache>
+            </c:numRef>
+          </c:val>
+          <c:extLst>
+            <c:ext xmlns:c16="http://schemas.microsoft.com/office/drawing/2014/chart" uri="{C3380CC4-5D6E-409C-BE32-E72D297353CC}">
+              <c16:uniqueId val="{00000000-13B0-464E-8E48-3324B2E07E06}"/>
+            </c:ext>
+          </c:extLst>
+        </c:ser>
+        <c:dLbls>
+          <c:dLblPos val="outEnd"/>
+          <c:showLegendKey val="0"/>
+          <c:showVal val="1"/>
+          <c:showCatName val="0"/>
+          <c:showSerName val="0"/>
+          <c:showPercent val="0"/>
+          <c:showBubbleSize val="0"/>
+        </c:dLbls>
+        <c:gapWidth val="182"/>
+        <c:axId val="615684000"/>
+        <c:axId val="615683040"/>
+      </c:barChart>
+      <c:catAx>
+        <c:axId val="615684000"/>
+        <c:scaling>
+          <c:orientation val="minMax"/>
+        </c:scaling>
+        <c:delete val="0"/>
+        <c:axPos val="l"/>
+        <c:numFmt formatCode="General" sourceLinked="1"/>
+        <c:majorTickMark val="none"/>
+        <c:minorTickMark val="none"/>
+        <c:tickLblPos val="nextTo"/>
+        <c:spPr>
+          <a:noFill/>
+          <a:ln w="9525" cap="flat" cmpd="sng" algn="ctr">
+            <a:solidFill>
+              <a:schemeClr val="tx1">
+                <a:lumMod val="15000"/>
+                <a:lumOff val="85000"/>
+              </a:schemeClr>
+            </a:solidFill>
+            <a:round/>
+          </a:ln>
+          <a:effectLst/>
+        </c:spPr>
+        <c:txPr>
+          <a:bodyPr rot="-60000000" spcFirstLastPara="1" vertOverflow="ellipsis" vert="horz" wrap="square" anchor="ctr" anchorCtr="1"/>
+          <a:lstStyle/>
+          <a:p>
+            <a:pPr>
+              <a:defRPr sz="1197" b="0" i="0" u="none" strike="noStrike" kern="1200" baseline="0">
+                <a:solidFill>
+                  <a:schemeClr val="tx1">
+                    <a:lumMod val="65000"/>
+                    <a:lumOff val="35000"/>
+                  </a:schemeClr>
+                </a:solidFill>
+                <a:latin typeface="+mn-lt"/>
+                <a:ea typeface="+mn-ea"/>
+                <a:cs typeface="+mn-cs"/>
+              </a:defRPr>
+            </a:pPr>
+            <a:endParaRPr lang="en-US"/>
+          </a:p>
+        </c:txPr>
+        <c:crossAx val="615683040"/>
+        <c:crosses val="autoZero"/>
+        <c:auto val="1"/>
+        <c:lblAlgn val="ctr"/>
+        <c:lblOffset val="100"/>
+        <c:noMultiLvlLbl val="0"/>
+      </c:catAx>
+      <c:valAx>
+        <c:axId val="615683040"/>
+        <c:scaling>
+          <c:orientation val="minMax"/>
+        </c:scaling>
+        <c:delete val="1"/>
+        <c:axPos val="b"/>
+        <c:numFmt formatCode="General" sourceLinked="1"/>
+        <c:majorTickMark val="none"/>
+        <c:minorTickMark val="none"/>
+        <c:tickLblPos val="nextTo"/>
+        <c:crossAx val="615684000"/>
+        <c:crosses val="autoZero"/>
+        <c:crossBetween val="between"/>
+      </c:valAx>
+      <c:spPr>
+        <a:noFill/>
+        <a:ln>
+          <a:noFill/>
+        </a:ln>
+        <a:effectLst/>
+      </c:spPr>
+    </c:plotArea>
+    <c:plotVisOnly val="1"/>
+    <c:dispBlanksAs val="gap"/>
+    <c:extLst>
+      <c:ext xmlns:c16r3="http://schemas.microsoft.com/office/drawing/2017/03/chart" uri="{56B9EC1D-385E-4148-901F-78D8002777C0}">
+        <c16r3:dataDisplayOptions16>
+          <c16r3:dispNaAsBlank val="1"/>
+        </c16r3:dataDisplayOptions16>
+      </c:ext>
+    </c:extLst>
+    <c:showDLblsOverMax val="0"/>
+  </c:chart>
+  <c:spPr>
+    <a:noFill/>
+    <a:ln>
+      <a:noFill/>
+    </a:ln>
+    <a:effectLst/>
+  </c:spPr>
+  <c:txPr>
+    <a:bodyPr/>
+    <a:lstStyle/>
+    <a:p>
+      <a:pPr>
+        <a:defRPr/>
+      </a:pPr>
+      <a:endParaRPr lang="en-US"/>
+    </a:p>
+  </c:txPr>
+  <c:externalData r:id="rId3">
+    <c:autoUpdate val="0"/>
+  </c:externalData>
+</c:chartSpace>
+</file>
+
 <file path=ppt/charts/colors1.xml><?xml version="1.0" encoding="utf-8"?>
+<cs:colorStyle xmlns:cs="http://schemas.microsoft.com/office/drawing/2012/chartStyle" xmlns:a="http://schemas.openxmlformats.org/drawingml/2006/main" meth="cycle" id="10">
+  <a:schemeClr val="accent1"/>
+  <a:schemeClr val="accent2"/>
+  <a:schemeClr val="accent3"/>
+  <a:schemeClr val="accent4"/>
+  <a:schemeClr val="accent5"/>
+  <a:schemeClr val="accent6"/>
+  <cs:variation/>
+  <cs:variation>
+    <a:lumMod val="60000"/>
+  </cs:variation>
+  <cs:variation>
+    <a:lumMod val="80000"/>
+    <a:lumOff val="20000"/>
+  </cs:variation>
+  <cs:variation>
+    <a:lumMod val="80000"/>
+  </cs:variation>
+  <cs:variation>
+    <a:lumMod val="60000"/>
+    <a:lumOff val="40000"/>
+  </cs:variation>
+  <cs:variation>
+    <a:lumMod val="50000"/>
+  </cs:variation>
+  <cs:variation>
+    <a:lumMod val="70000"/>
+    <a:lumOff val="30000"/>
+  </cs:variation>
+  <cs:variation>
+    <a:lumMod val="70000"/>
+  </cs:variation>
+  <cs:variation>
+    <a:lumMod val="50000"/>
+    <a:lumOff val="50000"/>
+  </cs:variation>
+</cs:colorStyle>
+</file>
+
+<file path=ppt/charts/colors2.xml><?xml version="1.0" encoding="utf-8"?>
 <cs:colorStyle xmlns:cs="http://schemas.microsoft.com/office/drawing/2012/chartStyle" xmlns:a="http://schemas.openxmlformats.org/drawingml/2006/main" meth="cycle" id="10">
   <a:schemeClr val="accent1"/>
   <a:schemeClr val="accent2"/>
@@ -1099,6 +1405,511 @@
             <a:lumOff val="85000"/>
           </a:schemeClr>
         </a:solidFill>
+      </a:ln>
+    </cs:spPr>
+  </cs:upBar>
+  <cs:valueAxis>
+    <cs:lnRef idx="0"/>
+    <cs:fillRef idx="0"/>
+    <cs:effectRef idx="0"/>
+    <cs:fontRef idx="minor">
+      <a:schemeClr val="tx1">
+        <a:lumMod val="65000"/>
+        <a:lumOff val="35000"/>
+      </a:schemeClr>
+    </cs:fontRef>
+    <cs:defRPr sz="1197" kern="1200"/>
+  </cs:valueAxis>
+  <cs:wall>
+    <cs:lnRef idx="0"/>
+    <cs:fillRef idx="0"/>
+    <cs:effectRef idx="0"/>
+    <cs:fontRef idx="minor">
+      <a:schemeClr val="tx1"/>
+    </cs:fontRef>
+    <cs:spPr>
+      <a:noFill/>
+      <a:ln>
+        <a:noFill/>
+      </a:ln>
+    </cs:spPr>
+  </cs:wall>
+</cs:chartStyle>
+</file>
+
+<file path=ppt/charts/style2.xml><?xml version="1.0" encoding="utf-8"?>
+<cs:chartStyle xmlns:cs="http://schemas.microsoft.com/office/drawing/2012/chartStyle" xmlns:a="http://schemas.openxmlformats.org/drawingml/2006/main" id="216">
+  <cs:axisTitle>
+    <cs:lnRef idx="0"/>
+    <cs:fillRef idx="0"/>
+    <cs:effectRef idx="0"/>
+    <cs:fontRef idx="minor">
+      <a:schemeClr val="tx1">
+        <a:lumMod val="65000"/>
+        <a:lumOff val="35000"/>
+      </a:schemeClr>
+    </cs:fontRef>
+    <cs:defRPr sz="1330" kern="1200"/>
+  </cs:axisTitle>
+  <cs:categoryAxis>
+    <cs:lnRef idx="0"/>
+    <cs:fillRef idx="0"/>
+    <cs:effectRef idx="0"/>
+    <cs:fontRef idx="minor">
+      <a:schemeClr val="tx1">
+        <a:lumMod val="65000"/>
+        <a:lumOff val="35000"/>
+      </a:schemeClr>
+    </cs:fontRef>
+    <cs:spPr>
+      <a:ln w="9525" cap="flat" cmpd="sng" algn="ctr">
+        <a:solidFill>
+          <a:schemeClr val="tx1">
+            <a:lumMod val="15000"/>
+            <a:lumOff val="85000"/>
+          </a:schemeClr>
+        </a:solidFill>
+        <a:round/>
+      </a:ln>
+    </cs:spPr>
+    <cs:defRPr sz="1197" kern="1200"/>
+  </cs:categoryAxis>
+  <cs:chartArea mods="allowNoFillOverride allowNoLineOverride">
+    <cs:lnRef idx="0"/>
+    <cs:fillRef idx="0"/>
+    <cs:effectRef idx="0"/>
+    <cs:fontRef idx="minor">
+      <a:schemeClr val="tx1"/>
+    </cs:fontRef>
+    <cs:spPr>
+      <a:solidFill>
+        <a:schemeClr val="bg1"/>
+      </a:solidFill>
+      <a:ln w="9525" cap="flat" cmpd="sng" algn="ctr">
+        <a:solidFill>
+          <a:schemeClr val="tx1">
+            <a:lumMod val="15000"/>
+            <a:lumOff val="85000"/>
+          </a:schemeClr>
+        </a:solidFill>
+        <a:round/>
+      </a:ln>
+    </cs:spPr>
+    <cs:defRPr sz="1330" kern="1200"/>
+  </cs:chartArea>
+  <cs:dataLabel>
+    <cs:lnRef idx="0"/>
+    <cs:fillRef idx="0"/>
+    <cs:effectRef idx="0"/>
+    <cs:fontRef idx="minor">
+      <a:schemeClr val="tx1">
+        <a:lumMod val="75000"/>
+        <a:lumOff val="25000"/>
+      </a:schemeClr>
+    </cs:fontRef>
+    <cs:defRPr sz="1197" kern="1200"/>
+  </cs:dataLabel>
+  <cs:dataLabelCallout>
+    <cs:lnRef idx="0"/>
+    <cs:fillRef idx="0"/>
+    <cs:effectRef idx="0"/>
+    <cs:fontRef idx="minor">
+      <a:schemeClr val="dk1">
+        <a:lumMod val="65000"/>
+        <a:lumOff val="35000"/>
+      </a:schemeClr>
+    </cs:fontRef>
+    <cs:spPr>
+      <a:solidFill>
+        <a:schemeClr val="lt1"/>
+      </a:solidFill>
+      <a:ln>
+        <a:solidFill>
+          <a:schemeClr val="dk1">
+            <a:lumMod val="25000"/>
+            <a:lumOff val="75000"/>
+          </a:schemeClr>
+        </a:solidFill>
+      </a:ln>
+    </cs:spPr>
+    <cs:defRPr sz="1197" kern="1200"/>
+    <cs:bodyPr rot="0" spcFirstLastPara="1" vertOverflow="clip" horzOverflow="clip" vert="horz" wrap="square" lIns="36576" tIns="18288" rIns="36576" bIns="18288" anchor="ctr" anchorCtr="1">
+      <a:spAutoFit/>
+    </cs:bodyPr>
+  </cs:dataLabelCallout>
+  <cs:dataPoint>
+    <cs:lnRef idx="0"/>
+    <cs:fillRef idx="1">
+      <cs:styleClr val="auto"/>
+    </cs:fillRef>
+    <cs:effectRef idx="0"/>
+    <cs:fontRef idx="minor">
+      <a:schemeClr val="tx1"/>
+    </cs:fontRef>
+  </cs:dataPoint>
+  <cs:dataPoint3D>
+    <cs:lnRef idx="0"/>
+    <cs:fillRef idx="1">
+      <cs:styleClr val="auto"/>
+    </cs:fillRef>
+    <cs:effectRef idx="0"/>
+    <cs:fontRef idx="minor">
+      <a:schemeClr val="tx1"/>
+    </cs:fontRef>
+  </cs:dataPoint3D>
+  <cs:dataPointLine>
+    <cs:lnRef idx="0">
+      <cs:styleClr val="auto"/>
+    </cs:lnRef>
+    <cs:fillRef idx="1"/>
+    <cs:effectRef idx="0"/>
+    <cs:fontRef idx="minor">
+      <a:schemeClr val="tx1"/>
+    </cs:fontRef>
+    <cs:spPr>
+      <a:ln w="28575" cap="rnd">
+        <a:solidFill>
+          <a:schemeClr val="phClr"/>
+        </a:solidFill>
+        <a:round/>
+      </a:ln>
+    </cs:spPr>
+  </cs:dataPointLine>
+  <cs:dataPointMarker>
+    <cs:lnRef idx="0">
+      <cs:styleClr val="auto"/>
+    </cs:lnRef>
+    <cs:fillRef idx="1">
+      <cs:styleClr val="auto"/>
+    </cs:fillRef>
+    <cs:effectRef idx="0"/>
+    <cs:fontRef idx="minor">
+      <a:schemeClr val="tx1"/>
+    </cs:fontRef>
+    <cs:spPr>
+      <a:ln w="9525">
+        <a:solidFill>
+          <a:schemeClr val="phClr"/>
+        </a:solidFill>
+      </a:ln>
+    </cs:spPr>
+  </cs:dataPointMarker>
+  <cs:dataPointMarkerLayout symbol="circle" size="5"/>
+  <cs:dataPointWireframe>
+    <cs:lnRef idx="0">
+      <cs:styleClr val="auto"/>
+    </cs:lnRef>
+    <cs:fillRef idx="1"/>
+    <cs:effectRef idx="0"/>
+    <cs:fontRef idx="minor">
+      <a:schemeClr val="tx1"/>
+    </cs:fontRef>
+    <cs:spPr>
+      <a:ln w="9525" cap="rnd">
+        <a:solidFill>
+          <a:schemeClr val="phClr"/>
+        </a:solidFill>
+        <a:round/>
+      </a:ln>
+    </cs:spPr>
+  </cs:dataPointWireframe>
+  <cs:dataTable>
+    <cs:lnRef idx="0"/>
+    <cs:fillRef idx="0"/>
+    <cs:effectRef idx="0"/>
+    <cs:fontRef idx="minor">
+      <a:schemeClr val="tx1">
+        <a:lumMod val="65000"/>
+        <a:lumOff val="35000"/>
+      </a:schemeClr>
+    </cs:fontRef>
+    <cs:spPr>
+      <a:noFill/>
+      <a:ln w="9525" cap="flat" cmpd="sng" algn="ctr">
+        <a:solidFill>
+          <a:schemeClr val="tx1">
+            <a:lumMod val="15000"/>
+            <a:lumOff val="85000"/>
+          </a:schemeClr>
+        </a:solidFill>
+        <a:round/>
+      </a:ln>
+    </cs:spPr>
+    <cs:defRPr sz="1197" kern="1200"/>
+  </cs:dataTable>
+  <cs:downBar>
+    <cs:lnRef idx="0"/>
+    <cs:fillRef idx="0"/>
+    <cs:effectRef idx="0"/>
+    <cs:fontRef idx="minor">
+      <a:schemeClr val="tx1"/>
+    </cs:fontRef>
+    <cs:spPr>
+      <a:solidFill>
+        <a:schemeClr val="dk1">
+          <a:lumMod val="75000"/>
+          <a:lumOff val="25000"/>
+        </a:schemeClr>
+      </a:solidFill>
+      <a:ln w="9525" cap="flat" cmpd="sng" algn="ctr">
+        <a:solidFill>
+          <a:schemeClr val="tx1">
+            <a:lumMod val="65000"/>
+            <a:lumOff val="35000"/>
+          </a:schemeClr>
+        </a:solidFill>
+        <a:round/>
+      </a:ln>
+    </cs:spPr>
+  </cs:downBar>
+  <cs:dropLine>
+    <cs:lnRef idx="0"/>
+    <cs:fillRef idx="0"/>
+    <cs:effectRef idx="0"/>
+    <cs:fontRef idx="minor">
+      <a:schemeClr val="tx1"/>
+    </cs:fontRef>
+    <cs:spPr>
+      <a:ln w="9525" cap="flat" cmpd="sng" algn="ctr">
+        <a:solidFill>
+          <a:schemeClr val="tx1">
+            <a:lumMod val="35000"/>
+            <a:lumOff val="65000"/>
+          </a:schemeClr>
+        </a:solidFill>
+        <a:round/>
+      </a:ln>
+    </cs:spPr>
+  </cs:dropLine>
+  <cs:errorBar>
+    <cs:lnRef idx="0"/>
+    <cs:fillRef idx="0"/>
+    <cs:effectRef idx="0"/>
+    <cs:fontRef idx="minor">
+      <a:schemeClr val="tx1"/>
+    </cs:fontRef>
+    <cs:spPr>
+      <a:ln w="9525" cap="flat" cmpd="sng" algn="ctr">
+        <a:solidFill>
+          <a:schemeClr val="tx1">
+            <a:lumMod val="65000"/>
+            <a:lumOff val="35000"/>
+          </a:schemeClr>
+        </a:solidFill>
+        <a:round/>
+      </a:ln>
+    </cs:spPr>
+  </cs:errorBar>
+  <cs:floor>
+    <cs:lnRef idx="0"/>
+    <cs:fillRef idx="0"/>
+    <cs:effectRef idx="0"/>
+    <cs:fontRef idx="minor">
+      <a:schemeClr val="tx1"/>
+    </cs:fontRef>
+    <cs:spPr>
+      <a:noFill/>
+      <a:ln>
+        <a:noFill/>
+      </a:ln>
+    </cs:spPr>
+  </cs:floor>
+  <cs:gridlineMajor>
+    <cs:lnRef idx="0"/>
+    <cs:fillRef idx="0"/>
+    <cs:effectRef idx="0"/>
+    <cs:fontRef idx="minor">
+      <a:schemeClr val="tx1"/>
+    </cs:fontRef>
+    <cs:spPr>
+      <a:ln w="9525" cap="flat" cmpd="sng" algn="ctr">
+        <a:solidFill>
+          <a:schemeClr val="tx1">
+            <a:lumMod val="15000"/>
+            <a:lumOff val="85000"/>
+          </a:schemeClr>
+        </a:solidFill>
+        <a:round/>
+      </a:ln>
+    </cs:spPr>
+  </cs:gridlineMajor>
+  <cs:gridlineMinor>
+    <cs:lnRef idx="0"/>
+    <cs:fillRef idx="0"/>
+    <cs:effectRef idx="0"/>
+    <cs:fontRef idx="minor">
+      <a:schemeClr val="tx1"/>
+    </cs:fontRef>
+    <cs:spPr>
+      <a:ln w="9525" cap="flat" cmpd="sng" algn="ctr">
+        <a:solidFill>
+          <a:schemeClr val="tx1">
+            <a:lumMod val="5000"/>
+            <a:lumOff val="95000"/>
+          </a:schemeClr>
+        </a:solidFill>
+        <a:round/>
+      </a:ln>
+    </cs:spPr>
+  </cs:gridlineMinor>
+  <cs:hiLoLine>
+    <cs:lnRef idx="0"/>
+    <cs:fillRef idx="0"/>
+    <cs:effectRef idx="0"/>
+    <cs:fontRef idx="minor">
+      <a:schemeClr val="tx1"/>
+    </cs:fontRef>
+    <cs:spPr>
+      <a:ln w="9525" cap="flat" cmpd="sng" algn="ctr">
+        <a:solidFill>
+          <a:schemeClr val="tx1">
+            <a:lumMod val="50000"/>
+            <a:lumOff val="50000"/>
+          </a:schemeClr>
+        </a:solidFill>
+        <a:round/>
+      </a:ln>
+    </cs:spPr>
+  </cs:hiLoLine>
+  <cs:leaderLine>
+    <cs:lnRef idx="0"/>
+    <cs:fillRef idx="0"/>
+    <cs:effectRef idx="0"/>
+    <cs:fontRef idx="minor">
+      <a:schemeClr val="tx1"/>
+    </cs:fontRef>
+    <cs:spPr>
+      <a:ln w="9525" cap="flat" cmpd="sng" algn="ctr">
+        <a:solidFill>
+          <a:schemeClr val="tx1">
+            <a:lumMod val="35000"/>
+            <a:lumOff val="65000"/>
+          </a:schemeClr>
+        </a:solidFill>
+        <a:round/>
+      </a:ln>
+    </cs:spPr>
+  </cs:leaderLine>
+  <cs:legend>
+    <cs:lnRef idx="0"/>
+    <cs:fillRef idx="0"/>
+    <cs:effectRef idx="0"/>
+    <cs:fontRef idx="minor">
+      <a:schemeClr val="tx1">
+        <a:lumMod val="65000"/>
+        <a:lumOff val="35000"/>
+      </a:schemeClr>
+    </cs:fontRef>
+    <cs:defRPr sz="1197" kern="1200"/>
+  </cs:legend>
+  <cs:plotArea mods="allowNoFillOverride allowNoLineOverride">
+    <cs:lnRef idx="0"/>
+    <cs:fillRef idx="0"/>
+    <cs:effectRef idx="0"/>
+    <cs:fontRef idx="minor">
+      <a:schemeClr val="tx1"/>
+    </cs:fontRef>
+  </cs:plotArea>
+  <cs:plotArea3D mods="allowNoFillOverride allowNoLineOverride">
+    <cs:lnRef idx="0"/>
+    <cs:fillRef idx="0"/>
+    <cs:effectRef idx="0"/>
+    <cs:fontRef idx="minor">
+      <a:schemeClr val="tx1"/>
+    </cs:fontRef>
+  </cs:plotArea3D>
+  <cs:seriesAxis>
+    <cs:lnRef idx="0"/>
+    <cs:fillRef idx="0"/>
+    <cs:effectRef idx="0"/>
+    <cs:fontRef idx="minor">
+      <a:schemeClr val="tx1">
+        <a:lumMod val="65000"/>
+        <a:lumOff val="35000"/>
+      </a:schemeClr>
+    </cs:fontRef>
+    <cs:defRPr sz="1197" kern="1200"/>
+  </cs:seriesAxis>
+  <cs:seriesLine>
+    <cs:lnRef idx="0"/>
+    <cs:fillRef idx="0"/>
+    <cs:effectRef idx="0"/>
+    <cs:fontRef idx="minor">
+      <a:schemeClr val="tx1"/>
+    </cs:fontRef>
+    <cs:spPr>
+      <a:ln w="9525" cap="flat" cmpd="sng" algn="ctr">
+        <a:solidFill>
+          <a:schemeClr val="tx1">
+            <a:lumMod val="35000"/>
+            <a:lumOff val="65000"/>
+          </a:schemeClr>
+        </a:solidFill>
+        <a:round/>
+      </a:ln>
+    </cs:spPr>
+  </cs:seriesLine>
+  <cs:title>
+    <cs:lnRef idx="0"/>
+    <cs:fillRef idx="0"/>
+    <cs:effectRef idx="0"/>
+    <cs:fontRef idx="minor">
+      <a:schemeClr val="tx1">
+        <a:lumMod val="65000"/>
+        <a:lumOff val="35000"/>
+      </a:schemeClr>
+    </cs:fontRef>
+    <cs:defRPr sz="1862" b="0" kern="1200" spc="0" baseline="0"/>
+  </cs:title>
+  <cs:trendline>
+    <cs:lnRef idx="0">
+      <cs:styleClr val="auto"/>
+    </cs:lnRef>
+    <cs:fillRef idx="0"/>
+    <cs:effectRef idx="0"/>
+    <cs:fontRef idx="minor">
+      <a:schemeClr val="tx1"/>
+    </cs:fontRef>
+    <cs:spPr>
+      <a:ln w="19050" cap="rnd">
+        <a:solidFill>
+          <a:schemeClr val="phClr"/>
+        </a:solidFill>
+        <a:prstDash val="sysDot"/>
+      </a:ln>
+    </cs:spPr>
+  </cs:trendline>
+  <cs:trendlineLabel>
+    <cs:lnRef idx="0"/>
+    <cs:fillRef idx="0"/>
+    <cs:effectRef idx="0"/>
+    <cs:fontRef idx="minor">
+      <a:schemeClr val="tx1">
+        <a:lumMod val="65000"/>
+        <a:lumOff val="35000"/>
+      </a:schemeClr>
+    </cs:fontRef>
+    <cs:defRPr sz="1197" kern="1200"/>
+  </cs:trendlineLabel>
+  <cs:upBar>
+    <cs:lnRef idx="0"/>
+    <cs:fillRef idx="0"/>
+    <cs:effectRef idx="0"/>
+    <cs:fontRef idx="minor">
+      <a:schemeClr val="tx1"/>
+    </cs:fontRef>
+    <cs:spPr>
+      <a:solidFill>
+        <a:schemeClr val="lt1"/>
+      </a:solidFill>
+      <a:ln w="9525" cap="flat" cmpd="sng" algn="ctr">
+        <a:solidFill>
+          <a:schemeClr val="tx1">
+            <a:lumMod val="65000"/>
+            <a:lumOff val="35000"/>
+          </a:schemeClr>
+        </a:solidFill>
+        <a:round/>
       </a:ln>
     </cs:spPr>
   </cs:upBar>
@@ -9449,7 +10260,7 @@
           <a:p>
             <a:r>
               <a:rPr lang="en-US" dirty="0"/>
-              <a:t>TF-IDF transforms “raw” bill text into feature vectors</a:t>
+              <a:t>TF-IDF transformed “raw” bill text into feature vectors</a:t>
             </a:r>
           </a:p>
         </p:txBody>
@@ -11338,6 +12149,611 @@
 </p:sld>
 </file>
 
+<file path=ppt/slides/slide7.xml><?xml version="1.0" encoding="utf-8"?>
+<p:sld xmlns:a="http://schemas.openxmlformats.org/drawingml/2006/main" xmlns:r="http://schemas.openxmlformats.org/officeDocument/2006/relationships" xmlns:p="http://schemas.openxmlformats.org/presentationml/2006/main">
+  <p:cSld>
+    <p:spTree>
+      <p:nvGrpSpPr>
+        <p:cNvPr id="1" name=""/>
+        <p:cNvGrpSpPr/>
+        <p:nvPr/>
+      </p:nvGrpSpPr>
+      <p:grpSpPr>
+        <a:xfrm>
+          <a:off x="0" y="0"/>
+          <a:ext cx="0" cy="0"/>
+          <a:chOff x="0" y="0"/>
+          <a:chExt cx="0" cy="0"/>
+        </a:xfrm>
+      </p:grpSpPr>
+      <p:sp>
+        <p:nvSpPr>
+          <p:cNvPr id="2" name="Title 1">
+            <a:extLst>
+              <a:ext uri="{FF2B5EF4-FFF2-40B4-BE49-F238E27FC236}">
+                <a16:creationId xmlns:a16="http://schemas.microsoft.com/office/drawing/2014/main" id="{4565A30B-2187-8C84-E480-C347EA58B10E}"/>
+              </a:ext>
+            </a:extLst>
+          </p:cNvPr>
+          <p:cNvSpPr>
+            <a:spLocks noGrp="1"/>
+          </p:cNvSpPr>
+          <p:nvPr>
+            <p:ph type="title"/>
+          </p:nvPr>
+        </p:nvSpPr>
+        <p:spPr/>
+        <p:txBody>
+          <a:bodyPr/>
+          <a:lstStyle/>
+          <a:p>
+            <a:r>
+              <a:rPr lang="en-US" dirty="0"/>
+              <a:t>3 different models were tested on extracted feature vectors</a:t>
+            </a:r>
+          </a:p>
+        </p:txBody>
+      </p:sp>
+      <p:graphicFrame>
+        <p:nvGraphicFramePr>
+          <p:cNvPr id="5" name="Chart 4">
+            <a:extLst>
+              <a:ext uri="{FF2B5EF4-FFF2-40B4-BE49-F238E27FC236}">
+                <a16:creationId xmlns:a16="http://schemas.microsoft.com/office/drawing/2014/main" id="{34AF1E50-A63D-6B53-2189-FCD4BC89047A}"/>
+              </a:ext>
+            </a:extLst>
+          </p:cNvPr>
+          <p:cNvGraphicFramePr/>
+          <p:nvPr>
+            <p:extLst>
+              <p:ext uri="{D42A27DB-BD31-4B8C-83A1-F6EECF244321}">
+                <p14:modId xmlns:p14="http://schemas.microsoft.com/office/powerpoint/2010/main" val="2456193072"/>
+              </p:ext>
+            </p:extLst>
+          </p:nvPr>
+        </p:nvGraphicFramePr>
+        <p:xfrm>
+          <a:off x="1047750" y="2185987"/>
+          <a:ext cx="10239375" cy="2461683"/>
+        </p:xfrm>
+        <a:graphic>
+          <a:graphicData uri="http://schemas.openxmlformats.org/drawingml/2006/chart">
+            <c:chart xmlns:c="http://schemas.openxmlformats.org/drawingml/2006/chart" xmlns:r="http://schemas.openxmlformats.org/officeDocument/2006/relationships" r:id="rId2"/>
+          </a:graphicData>
+        </a:graphic>
+      </p:graphicFrame>
+      <p:sp>
+        <p:nvSpPr>
+          <p:cNvPr id="6" name="Rectangle: Rounded Corners 5">
+            <a:extLst>
+              <a:ext uri="{FF2B5EF4-FFF2-40B4-BE49-F238E27FC236}">
+                <a16:creationId xmlns:a16="http://schemas.microsoft.com/office/drawing/2014/main" id="{302AA96E-5AD2-F547-5424-3B2CB5A6C22A}"/>
+              </a:ext>
+            </a:extLst>
+          </p:cNvPr>
+          <p:cNvSpPr/>
+          <p:nvPr/>
+        </p:nvSpPr>
+        <p:spPr>
+          <a:xfrm>
+            <a:off x="838200" y="1690688"/>
+            <a:ext cx="10515600" cy="3042708"/>
+          </a:xfrm>
+          <a:prstGeom prst="roundRect">
+            <a:avLst>
+              <a:gd name="adj" fmla="val 5528"/>
+            </a:avLst>
+          </a:prstGeom>
+          <a:noFill/>
+          <a:ln>
+            <a:solidFill>
+              <a:schemeClr val="bg1">
+                <a:lumMod val="85000"/>
+              </a:schemeClr>
+            </a:solidFill>
+          </a:ln>
+        </p:spPr>
+        <p:style>
+          <a:lnRef idx="2">
+            <a:schemeClr val="accent1">
+              <a:shade val="15000"/>
+            </a:schemeClr>
+          </a:lnRef>
+          <a:fillRef idx="1">
+            <a:schemeClr val="accent1"/>
+          </a:fillRef>
+          <a:effectRef idx="0">
+            <a:schemeClr val="accent1"/>
+          </a:effectRef>
+          <a:fontRef idx="minor">
+            <a:schemeClr val="lt1"/>
+          </a:fontRef>
+        </p:style>
+        <p:txBody>
+          <a:bodyPr rtlCol="0" anchor="t"/>
+          <a:lstStyle/>
+          <a:p>
+            <a:r>
+              <a:rPr lang="en-US" dirty="0">
+                <a:solidFill>
+                  <a:schemeClr val="accent1">
+                    <a:lumMod val="75000"/>
+                  </a:schemeClr>
+                </a:solidFill>
+              </a:rPr>
+              <a:t>Relative model performance (macro recall) on a test dataset</a:t>
+            </a:r>
+          </a:p>
+        </p:txBody>
+      </p:sp>
+      <p:grpSp>
+        <p:nvGrpSpPr>
+          <p:cNvPr id="17" name="Group 16">
+            <a:extLst>
+              <a:ext uri="{FF2B5EF4-FFF2-40B4-BE49-F238E27FC236}">
+                <a16:creationId xmlns:a16="http://schemas.microsoft.com/office/drawing/2014/main" id="{8506B525-090D-A4B3-ECF0-CEEF46C3C195}"/>
+              </a:ext>
+            </a:extLst>
+          </p:cNvPr>
+          <p:cNvGrpSpPr/>
+          <p:nvPr/>
+        </p:nvGrpSpPr>
+        <p:grpSpPr>
+          <a:xfrm>
+            <a:off x="838200" y="5010232"/>
+            <a:ext cx="5968424" cy="936831"/>
+            <a:chOff x="838200" y="4936341"/>
+            <a:chExt cx="5968424" cy="936831"/>
+          </a:xfrm>
+        </p:grpSpPr>
+        <p:sp>
+          <p:nvSpPr>
+            <p:cNvPr id="8" name="Rectangle: Rounded Corners 7">
+              <a:extLst>
+                <a:ext uri="{FF2B5EF4-FFF2-40B4-BE49-F238E27FC236}">
+                  <a16:creationId xmlns:a16="http://schemas.microsoft.com/office/drawing/2014/main" id="{42F908FC-5994-7CAB-7CC4-96BFB72F949C}"/>
+                </a:ext>
+              </a:extLst>
+            </p:cNvPr>
+            <p:cNvSpPr/>
+            <p:nvPr/>
+          </p:nvSpPr>
+          <p:spPr>
+            <a:xfrm>
+              <a:off x="838200" y="4936341"/>
+              <a:ext cx="5968424" cy="936831"/>
+            </a:xfrm>
+            <a:prstGeom prst="roundRect">
+              <a:avLst/>
+            </a:prstGeom>
+            <a:noFill/>
+            <a:ln w="12700">
+              <a:solidFill>
+                <a:schemeClr val="accent1">
+                  <a:lumMod val="75000"/>
+                </a:schemeClr>
+              </a:solidFill>
+            </a:ln>
+          </p:spPr>
+          <p:style>
+            <a:lnRef idx="2">
+              <a:schemeClr val="accent1">
+                <a:shade val="15000"/>
+              </a:schemeClr>
+            </a:lnRef>
+            <a:fillRef idx="1">
+              <a:schemeClr val="accent1"/>
+            </a:fillRef>
+            <a:effectRef idx="0">
+              <a:schemeClr val="accent1"/>
+            </a:effectRef>
+            <a:fontRef idx="minor">
+              <a:schemeClr val="lt1"/>
+            </a:fontRef>
+          </p:style>
+          <p:txBody>
+            <a:bodyPr rtlCol="0" anchor="ctr"/>
+            <a:lstStyle/>
+            <a:p>
+              <a:pPr marL="640080"/>
+              <a:r>
+                <a:rPr lang="en-US" sz="1400" b="1" dirty="0">
+                  <a:solidFill>
+                    <a:schemeClr val="accent1"/>
+                  </a:solidFill>
+                </a:rPr>
+                <a:t>Recall is the rate of true positives over all actual positive class instances </a:t>
+              </a:r>
+              <a:r>
+                <a:rPr lang="en-US" sz="1400" dirty="0">
+                  <a:solidFill>
+                    <a:schemeClr val="accent1"/>
+                  </a:solidFill>
+                </a:rPr>
+                <a:t>(true positives + false negatives); </a:t>
+              </a:r>
+              <a:r>
+                <a:rPr lang="en-US" sz="1400" b="1" dirty="0">
+                  <a:solidFill>
+                    <a:schemeClr val="accent1"/>
+                  </a:solidFill>
+                </a:rPr>
+                <a:t>macro recall averages recall values across all classes </a:t>
+              </a:r>
+              <a:r>
+                <a:rPr lang="en-US" sz="1400" dirty="0">
+                  <a:solidFill>
+                    <a:schemeClr val="accent1"/>
+                  </a:solidFill>
+                </a:rPr>
+                <a:t>without considering imbalance</a:t>
+              </a:r>
+              <a:endParaRPr lang="en-US" sz="1400" b="1" dirty="0">
+                <a:solidFill>
+                  <a:schemeClr val="accent1"/>
+                </a:solidFill>
+              </a:endParaRPr>
+            </a:p>
+          </p:txBody>
+        </p:sp>
+        <p:pic>
+          <p:nvPicPr>
+            <p:cNvPr id="9" name="Graphic 8">
+              <a:extLst>
+                <a:ext uri="{FF2B5EF4-FFF2-40B4-BE49-F238E27FC236}">
+                  <a16:creationId xmlns:a16="http://schemas.microsoft.com/office/drawing/2014/main" id="{53C8E0BE-32F8-0395-1D79-E6733A255023}"/>
+                </a:ext>
+              </a:extLst>
+            </p:cNvPr>
+            <p:cNvPicPr>
+              <a:picLocks noChangeAspect="1"/>
+            </p:cNvPicPr>
+            <p:nvPr/>
+          </p:nvPicPr>
+          <p:blipFill>
+            <a:blip r:embed="rId3">
+              <a:extLst>
+                <a:ext uri="{96DAC541-7B7A-43D3-8B79-37D633B846F1}">
+                  <asvg:svgBlip xmlns:asvg="http://schemas.microsoft.com/office/drawing/2016/SVG/main" r:embed="rId4"/>
+                </a:ext>
+              </a:extLst>
+            </a:blip>
+            <a:srcRect/>
+            <a:stretch/>
+          </p:blipFill>
+          <p:spPr>
+            <a:xfrm>
+              <a:off x="899143" y="5081813"/>
+              <a:ext cx="645886" cy="645886"/>
+            </a:xfrm>
+            <a:prstGeom prst="rect">
+              <a:avLst/>
+            </a:prstGeom>
+          </p:spPr>
+        </p:pic>
+      </p:grpSp>
+      <p:grpSp>
+        <p:nvGrpSpPr>
+          <p:cNvPr id="16" name="Group 15">
+            <a:extLst>
+              <a:ext uri="{FF2B5EF4-FFF2-40B4-BE49-F238E27FC236}">
+                <a16:creationId xmlns:a16="http://schemas.microsoft.com/office/drawing/2014/main" id="{C2BA8560-D6CB-52DC-A3ED-3D8EE3730A5B}"/>
+              </a:ext>
+            </a:extLst>
+          </p:cNvPr>
+          <p:cNvGrpSpPr/>
+          <p:nvPr/>
+        </p:nvGrpSpPr>
+        <p:grpSpPr>
+          <a:xfrm>
+            <a:off x="6997700" y="3933777"/>
+            <a:ext cx="4220845" cy="645887"/>
+            <a:chOff x="6334125" y="4936341"/>
+            <a:chExt cx="4314825" cy="645887"/>
+          </a:xfrm>
+        </p:grpSpPr>
+        <p:sp>
+          <p:nvSpPr>
+            <p:cNvPr id="12" name="Rectangle: Rounded Corners 11">
+              <a:extLst>
+                <a:ext uri="{FF2B5EF4-FFF2-40B4-BE49-F238E27FC236}">
+                  <a16:creationId xmlns:a16="http://schemas.microsoft.com/office/drawing/2014/main" id="{87842739-DD7D-45DA-AA6C-685C5A38D5FC}"/>
+                </a:ext>
+              </a:extLst>
+            </p:cNvPr>
+            <p:cNvSpPr/>
+            <p:nvPr/>
+          </p:nvSpPr>
+          <p:spPr>
+            <a:xfrm>
+              <a:off x="6334125" y="4936341"/>
+              <a:ext cx="4314825" cy="645887"/>
+            </a:xfrm>
+            <a:prstGeom prst="roundRect">
+              <a:avLst/>
+            </a:prstGeom>
+            <a:solidFill>
+              <a:schemeClr val="bg1">
+                <a:lumMod val="95000"/>
+              </a:schemeClr>
+            </a:solidFill>
+            <a:ln w="12700">
+              <a:noFill/>
+            </a:ln>
+          </p:spPr>
+          <p:style>
+            <a:lnRef idx="2">
+              <a:schemeClr val="accent1">
+                <a:shade val="15000"/>
+              </a:schemeClr>
+            </a:lnRef>
+            <a:fillRef idx="1">
+              <a:schemeClr val="accent1"/>
+            </a:fillRef>
+            <a:effectRef idx="0">
+              <a:schemeClr val="accent1"/>
+            </a:effectRef>
+            <a:fontRef idx="minor">
+              <a:schemeClr val="lt1"/>
+            </a:fontRef>
+          </p:style>
+          <p:txBody>
+            <a:bodyPr rtlCol="0" anchor="ctr"/>
+            <a:lstStyle/>
+            <a:p>
+              <a:pPr marL="640080"/>
+              <a:r>
+                <a:rPr lang="en-US" sz="1400" b="1" dirty="0">
+                  <a:solidFill>
+                    <a:schemeClr val="accent1"/>
+                  </a:solidFill>
+                </a:rPr>
+                <a:t>Models were tested using a grid search</a:t>
+              </a:r>
+              <a:r>
+                <a:rPr lang="en-US" sz="1400" dirty="0">
+                  <a:solidFill>
+                    <a:schemeClr val="accent1"/>
+                  </a:solidFill>
+                </a:rPr>
+                <a:t>, modulating parameters like C (regularization)</a:t>
+              </a:r>
+              <a:endParaRPr lang="en-US" sz="1400" b="1" dirty="0">
+                <a:solidFill>
+                  <a:schemeClr val="accent1"/>
+                </a:solidFill>
+              </a:endParaRPr>
+            </a:p>
+          </p:txBody>
+        </p:sp>
+        <p:pic>
+          <p:nvPicPr>
+            <p:cNvPr id="13" name="Graphic 12">
+              <a:extLst>
+                <a:ext uri="{FF2B5EF4-FFF2-40B4-BE49-F238E27FC236}">
+                  <a16:creationId xmlns:a16="http://schemas.microsoft.com/office/drawing/2014/main" id="{AA8B6BC6-4A7B-5424-9342-491D4BC63263}"/>
+                </a:ext>
+              </a:extLst>
+            </p:cNvPr>
+            <p:cNvPicPr>
+              <a:picLocks noChangeAspect="1"/>
+            </p:cNvPicPr>
+            <p:nvPr/>
+          </p:nvPicPr>
+          <p:blipFill>
+            <a:blip r:embed="rId5">
+              <a:extLst>
+                <a:ext uri="{96DAC541-7B7A-43D3-8B79-37D633B846F1}">
+                  <asvg:svgBlip xmlns:asvg="http://schemas.microsoft.com/office/drawing/2016/SVG/main" r:embed="rId6"/>
+                </a:ext>
+              </a:extLst>
+            </a:blip>
+            <a:srcRect/>
+            <a:stretch/>
+          </p:blipFill>
+          <p:spPr>
+            <a:xfrm>
+              <a:off x="6476983" y="5020198"/>
+              <a:ext cx="478172" cy="478172"/>
+            </a:xfrm>
+            <a:prstGeom prst="rect">
+              <a:avLst/>
+            </a:prstGeom>
+          </p:spPr>
+        </p:pic>
+      </p:grpSp>
+      <p:grpSp>
+        <p:nvGrpSpPr>
+          <p:cNvPr id="18" name="Group 17">
+            <a:extLst>
+              <a:ext uri="{FF2B5EF4-FFF2-40B4-BE49-F238E27FC236}">
+                <a16:creationId xmlns:a16="http://schemas.microsoft.com/office/drawing/2014/main" id="{C0A0DD90-5FA8-06B0-7AF6-304856A78998}"/>
+              </a:ext>
+            </a:extLst>
+          </p:cNvPr>
+          <p:cNvGrpSpPr/>
+          <p:nvPr/>
+        </p:nvGrpSpPr>
+        <p:grpSpPr>
+          <a:xfrm>
+            <a:off x="7446487" y="5010229"/>
+            <a:ext cx="3907313" cy="936831"/>
+            <a:chOff x="838200" y="4936341"/>
+            <a:chExt cx="3907313" cy="936831"/>
+          </a:xfrm>
+        </p:grpSpPr>
+        <p:sp>
+          <p:nvSpPr>
+            <p:cNvPr id="19" name="Rectangle: Rounded Corners 18">
+              <a:extLst>
+                <a:ext uri="{FF2B5EF4-FFF2-40B4-BE49-F238E27FC236}">
+                  <a16:creationId xmlns:a16="http://schemas.microsoft.com/office/drawing/2014/main" id="{C19BF851-0B0C-7AD4-AB3E-534FE297A0E9}"/>
+                </a:ext>
+              </a:extLst>
+            </p:cNvPr>
+            <p:cNvSpPr/>
+            <p:nvPr/>
+          </p:nvSpPr>
+          <p:spPr>
+            <a:xfrm>
+              <a:off x="838200" y="4936341"/>
+              <a:ext cx="3907313" cy="936831"/>
+            </a:xfrm>
+            <a:prstGeom prst="roundRect">
+              <a:avLst/>
+            </a:prstGeom>
+            <a:solidFill>
+              <a:schemeClr val="accent1">
+                <a:lumMod val="60000"/>
+                <a:lumOff val="40000"/>
+              </a:schemeClr>
+            </a:solidFill>
+            <a:ln w="12700">
+              <a:solidFill>
+                <a:schemeClr val="accent1">
+                  <a:lumMod val="75000"/>
+                </a:schemeClr>
+              </a:solidFill>
+            </a:ln>
+          </p:spPr>
+          <p:style>
+            <a:lnRef idx="2">
+              <a:schemeClr val="accent1">
+                <a:shade val="15000"/>
+              </a:schemeClr>
+            </a:lnRef>
+            <a:fillRef idx="1">
+              <a:schemeClr val="accent1"/>
+            </a:fillRef>
+            <a:effectRef idx="0">
+              <a:schemeClr val="accent1"/>
+            </a:effectRef>
+            <a:fontRef idx="minor">
+              <a:schemeClr val="lt1"/>
+            </a:fontRef>
+          </p:style>
+          <p:txBody>
+            <a:bodyPr rtlCol="0" anchor="ctr"/>
+            <a:lstStyle/>
+            <a:p>
+              <a:pPr marL="640080"/>
+              <a:r>
+                <a:rPr lang="en-US" sz="1400" b="1" dirty="0">
+                  <a:solidFill>
+                    <a:schemeClr val="bg1"/>
+                  </a:solidFill>
+                </a:rPr>
+                <a:t>Metric choice was based on practical implications</a:t>
+              </a:r>
+              <a:r>
+                <a:rPr lang="en-US" sz="1400" dirty="0">
+                  <a:solidFill>
+                    <a:schemeClr val="bg1"/>
+                  </a:solidFill>
+                </a:rPr>
+                <a:t>, where catching relevant (potentially niche) legislation is critical</a:t>
+              </a:r>
+            </a:p>
+          </p:txBody>
+        </p:sp>
+        <p:pic>
+          <p:nvPicPr>
+            <p:cNvPr id="20" name="Graphic 19">
+              <a:extLst>
+                <a:ext uri="{FF2B5EF4-FFF2-40B4-BE49-F238E27FC236}">
+                  <a16:creationId xmlns:a16="http://schemas.microsoft.com/office/drawing/2014/main" id="{9933BEB3-1A87-D6FF-A47F-8964E60FAF44}"/>
+                </a:ext>
+              </a:extLst>
+            </p:cNvPr>
+            <p:cNvPicPr>
+              <a:picLocks noChangeAspect="1"/>
+            </p:cNvPicPr>
+            <p:nvPr/>
+          </p:nvPicPr>
+          <p:blipFill>
+            <a:blip r:embed="rId7">
+              <a:extLst>
+                <a:ext uri="{96DAC541-7B7A-43D3-8B79-37D633B846F1}">
+                  <asvg:svgBlip xmlns:asvg="http://schemas.microsoft.com/office/drawing/2016/SVG/main" r:embed="rId8"/>
+                </a:ext>
+              </a:extLst>
+            </a:blip>
+            <a:srcRect/>
+            <a:stretch/>
+          </p:blipFill>
+          <p:spPr>
+            <a:xfrm>
+              <a:off x="899143" y="5081813"/>
+              <a:ext cx="645886" cy="645886"/>
+            </a:xfrm>
+            <a:prstGeom prst="rect">
+              <a:avLst/>
+            </a:prstGeom>
+          </p:spPr>
+        </p:pic>
+      </p:grpSp>
+      <p:sp>
+        <p:nvSpPr>
+          <p:cNvPr id="23" name="Isosceles Triangle 22">
+            <a:extLst>
+              <a:ext uri="{FF2B5EF4-FFF2-40B4-BE49-F238E27FC236}">
+                <a16:creationId xmlns:a16="http://schemas.microsoft.com/office/drawing/2014/main" id="{218B3C69-84FA-9FF5-B111-3F916F9BF54F}"/>
+              </a:ext>
+            </a:extLst>
+          </p:cNvPr>
+          <p:cNvSpPr/>
+          <p:nvPr/>
+        </p:nvSpPr>
+        <p:spPr>
+          <a:xfrm rot="5400000">
+            <a:off x="7003688" y="5349788"/>
+            <a:ext cx="245735" cy="257711"/>
+          </a:xfrm>
+          <a:prstGeom prst="triangle">
+            <a:avLst/>
+          </a:prstGeom>
+          <a:solidFill>
+            <a:schemeClr val="accent1"/>
+          </a:solidFill>
+        </p:spPr>
+        <p:style>
+          <a:lnRef idx="2">
+            <a:schemeClr val="accent1">
+              <a:shade val="15000"/>
+            </a:schemeClr>
+          </a:lnRef>
+          <a:fillRef idx="1">
+            <a:schemeClr val="accent1"/>
+          </a:fillRef>
+          <a:effectRef idx="0">
+            <a:schemeClr val="accent1"/>
+          </a:effectRef>
+          <a:fontRef idx="minor">
+            <a:schemeClr val="lt1"/>
+          </a:fontRef>
+        </p:style>
+        <p:txBody>
+          <a:bodyPr rtlCol="0" anchor="ctr"/>
+          <a:lstStyle/>
+          <a:p>
+            <a:pPr algn="ctr"/>
+            <a:endParaRPr lang="en-US"/>
+          </a:p>
+        </p:txBody>
+      </p:sp>
+    </p:spTree>
+    <p:extLst>
+      <p:ext uri="{BB962C8B-B14F-4D97-AF65-F5344CB8AC3E}">
+        <p14:creationId xmlns:p14="http://schemas.microsoft.com/office/powerpoint/2010/main" val="3499367079"/>
+      </p:ext>
+    </p:extLst>
+  </p:cSld>
+  <p:clrMapOvr>
+    <a:masterClrMapping/>
+  </p:clrMapOvr>
+</p:sld>
+</file>
+
 <file path=ppt/theme/theme1.xml><?xml version="1.0" encoding="utf-8"?>
 <a:theme xmlns:a="http://schemas.openxmlformats.org/drawingml/2006/main" name="Office Theme">
   <a:themeElements>

</xml_diff>